<commit_message>
Major UI overhaul using high fidelity mock ups from Dovetailed
</commit_message>
<xml_diff>
--- a/webApp/SharedResources/GrabArrow.pptx
+++ b/webApp/SharedResources/GrabArrow.pptx
@@ -104,6 +104,11 @@
       </a:defRPr>
     </a:lvl9pPr>
   </p:defaultTextStyle>
+  <p:extLst>
+    <p:ext uri="{EFAFB233-063F-42B5-8137-9DF3F51BA10A}">
+      <p15:sldGuideLst xmlns:p15="http://schemas.microsoft.com/office/powerpoint/2012/main"/>
+    </p:ext>
+  </p:extLst>
 </p:presentation>
 </file>
 
@@ -256,7 +261,7 @@
           <a:p>
             <a:fld id="{7A3023F3-1956-44E7-A77A-3725AB5EE87A}" type="datetimeFigureOut">
               <a:rPr lang="en-GB" smtClean="0"/>
-              <a:t>08/08/2018</a:t>
+              <a:t>21/08/2018</a:t>
             </a:fld>
             <a:endParaRPr lang="en-GB"/>
           </a:p>
@@ -456,7 +461,7 @@
           <a:p>
             <a:fld id="{7A3023F3-1956-44E7-A77A-3725AB5EE87A}" type="datetimeFigureOut">
               <a:rPr lang="en-GB" smtClean="0"/>
-              <a:t>08/08/2018</a:t>
+              <a:t>21/08/2018</a:t>
             </a:fld>
             <a:endParaRPr lang="en-GB"/>
           </a:p>
@@ -666,7 +671,7 @@
           <a:p>
             <a:fld id="{7A3023F3-1956-44E7-A77A-3725AB5EE87A}" type="datetimeFigureOut">
               <a:rPr lang="en-GB" smtClean="0"/>
-              <a:t>08/08/2018</a:t>
+              <a:t>21/08/2018</a:t>
             </a:fld>
             <a:endParaRPr lang="en-GB"/>
           </a:p>
@@ -866,7 +871,7 @@
           <a:p>
             <a:fld id="{7A3023F3-1956-44E7-A77A-3725AB5EE87A}" type="datetimeFigureOut">
               <a:rPr lang="en-GB" smtClean="0"/>
-              <a:t>08/08/2018</a:t>
+              <a:t>21/08/2018</a:t>
             </a:fld>
             <a:endParaRPr lang="en-GB"/>
           </a:p>
@@ -1142,7 +1147,7 @@
           <a:p>
             <a:fld id="{7A3023F3-1956-44E7-A77A-3725AB5EE87A}" type="datetimeFigureOut">
               <a:rPr lang="en-GB" smtClean="0"/>
-              <a:t>08/08/2018</a:t>
+              <a:t>21/08/2018</a:t>
             </a:fld>
             <a:endParaRPr lang="en-GB"/>
           </a:p>
@@ -1410,7 +1415,7 @@
           <a:p>
             <a:fld id="{7A3023F3-1956-44E7-A77A-3725AB5EE87A}" type="datetimeFigureOut">
               <a:rPr lang="en-GB" smtClean="0"/>
-              <a:t>08/08/2018</a:t>
+              <a:t>21/08/2018</a:t>
             </a:fld>
             <a:endParaRPr lang="en-GB"/>
           </a:p>
@@ -1825,7 +1830,7 @@
           <a:p>
             <a:fld id="{7A3023F3-1956-44E7-A77A-3725AB5EE87A}" type="datetimeFigureOut">
               <a:rPr lang="en-GB" smtClean="0"/>
-              <a:t>08/08/2018</a:t>
+              <a:t>21/08/2018</a:t>
             </a:fld>
             <a:endParaRPr lang="en-GB"/>
           </a:p>
@@ -1967,7 +1972,7 @@
           <a:p>
             <a:fld id="{7A3023F3-1956-44E7-A77A-3725AB5EE87A}" type="datetimeFigureOut">
               <a:rPr lang="en-GB" smtClean="0"/>
-              <a:t>08/08/2018</a:t>
+              <a:t>21/08/2018</a:t>
             </a:fld>
             <a:endParaRPr lang="en-GB"/>
           </a:p>
@@ -2080,7 +2085,7 @@
           <a:p>
             <a:fld id="{7A3023F3-1956-44E7-A77A-3725AB5EE87A}" type="datetimeFigureOut">
               <a:rPr lang="en-GB" smtClean="0"/>
-              <a:t>08/08/2018</a:t>
+              <a:t>21/08/2018</a:t>
             </a:fld>
             <a:endParaRPr lang="en-GB"/>
           </a:p>
@@ -2393,7 +2398,7 @@
           <a:p>
             <a:fld id="{7A3023F3-1956-44E7-A77A-3725AB5EE87A}" type="datetimeFigureOut">
               <a:rPr lang="en-GB" smtClean="0"/>
-              <a:t>08/08/2018</a:t>
+              <a:t>21/08/2018</a:t>
             </a:fld>
             <a:endParaRPr lang="en-GB"/>
           </a:p>
@@ -2682,7 +2687,7 @@
           <a:p>
             <a:fld id="{7A3023F3-1956-44E7-A77A-3725AB5EE87A}" type="datetimeFigureOut">
               <a:rPr lang="en-GB" smtClean="0"/>
-              <a:t>08/08/2018</a:t>
+              <a:t>21/08/2018</a:t>
             </a:fld>
             <a:endParaRPr lang="en-GB"/>
           </a:p>
@@ -2925,7 +2930,7 @@
           <a:p>
             <a:fld id="{7A3023F3-1956-44E7-A77A-3725AB5EE87A}" type="datetimeFigureOut">
               <a:rPr lang="en-GB" smtClean="0"/>
-              <a:t>08/08/2018</a:t>
+              <a:t>21/08/2018</a:t>
             </a:fld>
             <a:endParaRPr lang="en-GB"/>
           </a:p>
@@ -3344,6 +3349,52 @@
       </p:grpSpPr>
       <p:sp>
         <p:nvSpPr>
+          <p:cNvPr id="2" name="Rectangle 1">
+            <a:extLst>
+              <a:ext uri="{FF2B5EF4-FFF2-40B4-BE49-F238E27FC236}">
+                <a16:creationId xmlns:a16="http://schemas.microsoft.com/office/drawing/2014/main" id="{88315534-3CA8-4B24-9003-F956D44D6638}"/>
+              </a:ext>
+            </a:extLst>
+          </p:cNvPr>
+          <p:cNvSpPr/>
+          <p:nvPr/>
+        </p:nvSpPr>
+        <p:spPr>
+          <a:xfrm>
+            <a:off x="4146885" y="433137"/>
+            <a:ext cx="3200399" cy="3673642"/>
+          </a:xfrm>
+          <a:prstGeom prst="rect">
+            <a:avLst/>
+          </a:prstGeom>
+        </p:spPr>
+        <p:style>
+          <a:lnRef idx="2">
+            <a:schemeClr val="accent1">
+              <a:shade val="50000"/>
+            </a:schemeClr>
+          </a:lnRef>
+          <a:fillRef idx="1">
+            <a:schemeClr val="accent1"/>
+          </a:fillRef>
+          <a:effectRef idx="0">
+            <a:schemeClr val="accent1"/>
+          </a:effectRef>
+          <a:fontRef idx="minor">
+            <a:schemeClr val="lt1"/>
+          </a:fontRef>
+        </p:style>
+        <p:txBody>
+          <a:bodyPr rtlCol="0" anchor="ctr"/>
+          <a:lstStyle/>
+          <a:p>
+            <a:pPr algn="ctr"/>
+            <a:endParaRPr lang="en-GB"/>
+          </a:p>
+        </p:txBody>
+      </p:sp>
+      <p:sp>
+        <p:nvSpPr>
           <p:cNvPr id="4" name="Arrow: Quad 3">
             <a:extLst>
               <a:ext uri="{FF2B5EF4-FFF2-40B4-BE49-F238E27FC236}">
@@ -3395,6 +3446,134 @@
           <a:p>
             <a:pPr algn="ctr"/>
             <a:endParaRPr lang="en-GB"/>
+          </a:p>
+        </p:txBody>
+      </p:sp>
+      <p:sp>
+        <p:nvSpPr>
+          <p:cNvPr id="3" name="Arrow: Quad 2">
+            <a:extLst>
+              <a:ext uri="{FF2B5EF4-FFF2-40B4-BE49-F238E27FC236}">
+                <a16:creationId xmlns:a16="http://schemas.microsoft.com/office/drawing/2014/main" id="{E57A21A8-156A-4690-83D0-AAF541C19647}"/>
+              </a:ext>
+            </a:extLst>
+          </p:cNvPr>
+          <p:cNvSpPr/>
+          <p:nvPr/>
+        </p:nvSpPr>
+        <p:spPr>
+          <a:xfrm>
+            <a:off x="4146885" y="697831"/>
+            <a:ext cx="3112168" cy="3176338"/>
+          </a:xfrm>
+          <a:prstGeom prst="quadArrow">
+            <a:avLst>
+              <a:gd name="adj1" fmla="val 8876"/>
+              <a:gd name="adj2" fmla="val 18379"/>
+              <a:gd name="adj3" fmla="val 24344"/>
+            </a:avLst>
+          </a:prstGeom>
+          <a:solidFill>
+            <a:schemeClr val="bg1"/>
+          </a:solidFill>
+          <a:ln w="76200">
+            <a:solidFill>
+              <a:schemeClr val="tx1"/>
+            </a:solidFill>
+          </a:ln>
+        </p:spPr>
+        <p:style>
+          <a:lnRef idx="2">
+            <a:schemeClr val="accent1">
+              <a:shade val="50000"/>
+            </a:schemeClr>
+          </a:lnRef>
+          <a:fillRef idx="1">
+            <a:schemeClr val="accent1"/>
+          </a:fillRef>
+          <a:effectRef idx="0">
+            <a:schemeClr val="accent1"/>
+          </a:effectRef>
+          <a:fontRef idx="minor">
+            <a:schemeClr val="lt1"/>
+          </a:fontRef>
+        </p:style>
+        <p:txBody>
+          <a:bodyPr rtlCol="0" anchor="ctr"/>
+          <a:lstStyle/>
+          <a:p>
+            <a:pPr algn="ctr"/>
+            <a:endParaRPr lang="en-GB"/>
+          </a:p>
+        </p:txBody>
+      </p:sp>
+      <p:sp>
+        <p:nvSpPr>
+          <p:cNvPr id="5" name="TextBox 4">
+            <a:extLst>
+              <a:ext uri="{FF2B5EF4-FFF2-40B4-BE49-F238E27FC236}">
+                <a16:creationId xmlns:a16="http://schemas.microsoft.com/office/drawing/2014/main" id="{F4DA564B-74C7-4806-B781-4365664EF6B7}"/>
+              </a:ext>
+            </a:extLst>
+          </p:cNvPr>
+          <p:cNvSpPr txBox="1"/>
+          <p:nvPr/>
+        </p:nvSpPr>
+        <p:spPr>
+          <a:xfrm>
+            <a:off x="922422" y="4491789"/>
+            <a:ext cx="2943725" cy="369332"/>
+          </a:xfrm>
+          <a:prstGeom prst="rect">
+            <a:avLst/>
+          </a:prstGeom>
+          <a:noFill/>
+        </p:spPr>
+        <p:txBody>
+          <a:bodyPr wrap="square" rtlCol="0">
+            <a:spAutoFit/>
+          </a:bodyPr>
+          <a:lstStyle/>
+          <a:p>
+            <a:r>
+              <a:rPr lang="en-GB" dirty="0"/>
+              <a:t>This doesn’t have an outline</a:t>
+            </a:r>
+          </a:p>
+        </p:txBody>
+      </p:sp>
+      <p:sp>
+        <p:nvSpPr>
+          <p:cNvPr id="6" name="TextBox 5">
+            <a:extLst>
+              <a:ext uri="{FF2B5EF4-FFF2-40B4-BE49-F238E27FC236}">
+                <a16:creationId xmlns:a16="http://schemas.microsoft.com/office/drawing/2014/main" id="{56B8F702-FE55-4BEB-A597-AFE3FCCCF385}"/>
+              </a:ext>
+            </a:extLst>
+          </p:cNvPr>
+          <p:cNvSpPr txBox="1"/>
+          <p:nvPr/>
+        </p:nvSpPr>
+        <p:spPr>
+          <a:xfrm>
+            <a:off x="4315328" y="4491789"/>
+            <a:ext cx="2943725" cy="369332"/>
+          </a:xfrm>
+          <a:prstGeom prst="rect">
+            <a:avLst/>
+          </a:prstGeom>
+          <a:noFill/>
+        </p:spPr>
+        <p:txBody>
+          <a:bodyPr wrap="square" rtlCol="0">
+            <a:spAutoFit/>
+          </a:bodyPr>
+          <a:lstStyle/>
+          <a:p>
+            <a:r>
+              <a:rPr lang="en-GB" dirty="0"/>
+              <a:t>This has an outline</a:t>
+            </a:r>
           </a:p>
         </p:txBody>
       </p:sp>

</xml_diff>